<commit_message>
Started on Slide 1
</commit_message>
<xml_diff>
--- a/Presentation1.pptx
+++ b/Presentation1.pptx
@@ -111,6 +111,11 @@
       </a:defRPr>
     </a:lvl9pPr>
   </p:defaultTextStyle>
+  <p:extLst>
+    <p:ext uri="{EFAFB233-063F-42B5-8137-9DF3F51BA10A}">
+      <p15:sldGuideLst xmlns:p15="http://schemas.microsoft.com/office/powerpoint/2012/main"/>
+    </p:ext>
+  </p:extLst>
 </p:presentation>
 </file>
 
@@ -3423,7 +3428,7 @@
           <a:lstStyle/>
           <a:p>
             <a:pPr algn="ctr"/>
-            <a:endParaRPr lang="en-KE"/>
+            <a:endParaRPr lang="en-KE" dirty="0"/>
           </a:p>
         </p:txBody>
       </p:sp>
@@ -4031,6 +4036,162 @@
               <a:solidFill>
                 <a:schemeClr val="tx1"/>
               </a:solidFill>
+            </a:endParaRPr>
+          </a:p>
+        </p:txBody>
+      </p:sp>
+      <p:sp>
+        <p:nvSpPr>
+          <p:cNvPr id="2" name="TextBox 1">
+            <a:extLst>
+              <a:ext uri="{FF2B5EF4-FFF2-40B4-BE49-F238E27FC236}">
+                <a16:creationId xmlns:a16="http://schemas.microsoft.com/office/drawing/2014/main" id="{DAF0F9EE-7899-72B1-EBD8-E7C9D6A0533B}"/>
+              </a:ext>
+            </a:extLst>
+          </p:cNvPr>
+          <p:cNvSpPr txBox="1"/>
+          <p:nvPr/>
+        </p:nvSpPr>
+        <p:spPr>
+          <a:xfrm>
+            <a:off x="98474" y="211015"/>
+            <a:ext cx="6822831" cy="6647974"/>
+          </a:xfrm>
+          <a:prstGeom prst="rect">
+            <a:avLst/>
+          </a:prstGeom>
+          <a:noFill/>
+        </p:spPr>
+        <p:txBody>
+          <a:bodyPr wrap="square" rtlCol="0">
+            <a:spAutoFit/>
+          </a:bodyPr>
+          <a:lstStyle/>
+          <a:p>
+            <a:pPr algn="ctr"/>
+            <a:r>
+              <a:rPr lang="en-US" sz="6600" dirty="0" err="1">
+                <a:solidFill>
+                  <a:schemeClr val="bg1">
+                    <a:lumMod val="75000"/>
+                  </a:schemeClr>
+                </a:solidFill>
+                <a:latin typeface="Cooper Black" panose="0208090404030B020404" pitchFamily="18" charset="0"/>
+              </a:rPr>
+              <a:t>TrueClaim</a:t>
+            </a:r>
+            <a:r>
+              <a:rPr lang="en-US" sz="6600" dirty="0">
+                <a:solidFill>
+                  <a:schemeClr val="bg1">
+                    <a:lumMod val="75000"/>
+                  </a:schemeClr>
+                </a:solidFill>
+                <a:latin typeface="Cooper Black" panose="0208090404030B020404" pitchFamily="18" charset="0"/>
+              </a:rPr>
+              <a:t> AI</a:t>
+            </a:r>
+          </a:p>
+          <a:p>
+            <a:pPr algn="ctr"/>
+            <a:endParaRPr lang="en-US" sz="4000" dirty="0">
+              <a:solidFill>
+                <a:schemeClr val="bg1">
+                  <a:lumMod val="75000"/>
+                </a:schemeClr>
+              </a:solidFill>
+              <a:latin typeface="Cooper Black" panose="0208090404030B020404" pitchFamily="18" charset="0"/>
+            </a:endParaRPr>
+          </a:p>
+          <a:p>
+            <a:pPr algn="ctr"/>
+            <a:endParaRPr lang="en-US" sz="4000" dirty="0">
+              <a:solidFill>
+                <a:schemeClr val="bg1">
+                  <a:lumMod val="75000"/>
+                </a:schemeClr>
+              </a:solidFill>
+              <a:latin typeface="Cooper Black" panose="0208090404030B020404" pitchFamily="18" charset="0"/>
+            </a:endParaRPr>
+          </a:p>
+          <a:p>
+            <a:pPr algn="ctr"/>
+            <a:r>
+              <a:rPr lang="en-US" sz="4000" dirty="0">
+                <a:solidFill>
+                  <a:schemeClr val="bg1">
+                    <a:lumMod val="75000"/>
+                  </a:schemeClr>
+                </a:solidFill>
+                <a:latin typeface="Cooper Black" panose="0208090404030B020404" pitchFamily="18" charset="0"/>
+              </a:rPr>
+              <a:t>Presented By </a:t>
+            </a:r>
+          </a:p>
+          <a:p>
+            <a:pPr algn="ctr"/>
+            <a:endParaRPr lang="en-US" sz="4000" dirty="0">
+              <a:solidFill>
+                <a:schemeClr val="bg1">
+                  <a:lumMod val="75000"/>
+                </a:schemeClr>
+              </a:solidFill>
+              <a:latin typeface="Cooper Black" panose="0208090404030B020404" pitchFamily="18" charset="0"/>
+            </a:endParaRPr>
+          </a:p>
+          <a:p>
+            <a:pPr algn="ctr"/>
+            <a:endParaRPr lang="en-US" sz="4000" dirty="0">
+              <a:solidFill>
+                <a:schemeClr val="bg1">
+                  <a:lumMod val="75000"/>
+                </a:schemeClr>
+              </a:solidFill>
+              <a:latin typeface="Cooper Black" panose="0208090404030B020404" pitchFamily="18" charset="0"/>
+            </a:endParaRPr>
+          </a:p>
+          <a:p>
+            <a:pPr algn="ctr"/>
+            <a:endParaRPr lang="en-US" sz="4000" dirty="0">
+              <a:solidFill>
+                <a:schemeClr val="bg1">
+                  <a:lumMod val="75000"/>
+                </a:schemeClr>
+              </a:solidFill>
+              <a:latin typeface="Cooper Black" panose="0208090404030B020404" pitchFamily="18" charset="0"/>
+            </a:endParaRPr>
+          </a:p>
+          <a:p>
+            <a:pPr algn="ctr"/>
+            <a:r>
+              <a:rPr lang="en-US" sz="6000" dirty="0">
+                <a:solidFill>
+                  <a:schemeClr val="bg1">
+                    <a:lumMod val="75000"/>
+                  </a:schemeClr>
+                </a:solidFill>
+                <a:latin typeface="Cooper Black" panose="0208090404030B020404" pitchFamily="18" charset="0"/>
+              </a:rPr>
+              <a:t>The </a:t>
+            </a:r>
+            <a:r>
+              <a:rPr lang="en-US" sz="6000" dirty="0" err="1">
+                <a:solidFill>
+                  <a:schemeClr val="bg1">
+                    <a:lumMod val="75000"/>
+                  </a:schemeClr>
+                </a:solidFill>
+                <a:latin typeface="Cooper Black" panose="0208090404030B020404" pitchFamily="18" charset="0"/>
+              </a:rPr>
+              <a:t>Hacknovators</a:t>
+            </a:r>
+            <a:endParaRPr lang="en-KE" sz="6000" dirty="0">
+              <a:solidFill>
+                <a:schemeClr val="bg1">
+                  <a:lumMod val="75000"/>
+                </a:schemeClr>
+              </a:solidFill>
+              <a:latin typeface="Cooper Black" panose="0208090404030B020404" pitchFamily="18" charset="0"/>
             </a:endParaRPr>
           </a:p>
         </p:txBody>

</xml_diff>

<commit_message>
Added and corrected everything
</commit_message>
<xml_diff>
--- a/Presentation1.pptx
+++ b/Presentation1.pptx
@@ -4070,17 +4070,6 @@
           <a:p>
             <a:pPr algn="ctr"/>
             <a:r>
-              <a:rPr lang="en-US" sz="6600" dirty="0" err="1">
-                <a:solidFill>
-                  <a:schemeClr val="bg1">
-                    <a:lumMod val="75000"/>
-                  </a:schemeClr>
-                </a:solidFill>
-                <a:latin typeface="Cooper Black" panose="0208090404030B020404" pitchFamily="18" charset="0"/>
-              </a:rPr>
-              <a:t>TrueClaim</a:t>
-            </a:r>
-            <a:r>
               <a:rPr lang="en-US" sz="6600" dirty="0">
                 <a:solidFill>
                   <a:schemeClr val="bg1">
@@ -4089,7 +4078,7 @@
                 </a:solidFill>
                 <a:latin typeface="Cooper Black" panose="0208090404030B020404" pitchFamily="18" charset="0"/>
               </a:rPr>
-              <a:t> AI</a:t>
+              <a:t>TrueClaim AI</a:t>
             </a:r>
           </a:p>
           <a:p>
@@ -4172,18 +4161,7 @@
                 </a:solidFill>
                 <a:latin typeface="Cooper Black" panose="0208090404030B020404" pitchFamily="18" charset="0"/>
               </a:rPr>
-              <a:t>The </a:t>
-            </a:r>
-            <a:r>
-              <a:rPr lang="en-US" sz="6000" dirty="0" err="1">
-                <a:solidFill>
-                  <a:schemeClr val="bg1">
-                    <a:lumMod val="75000"/>
-                  </a:schemeClr>
-                </a:solidFill>
-                <a:latin typeface="Cooper Black" panose="0208090404030B020404" pitchFamily="18" charset="0"/>
-              </a:rPr>
-              <a:t>Hacknovators</a:t>
+              <a:t>The Hacknovators</a:t>
             </a:r>
             <a:endParaRPr lang="en-KE" sz="6000" dirty="0">
               <a:solidFill>
@@ -4237,6 +4215,343 @@
           </a:p>
         </p:txBody>
       </p:sp>
+      <p:sp>
+        <p:nvSpPr>
+          <p:cNvPr id="5" name="TextBox 4">
+            <a:extLst>
+              <a:ext uri="{FF2B5EF4-FFF2-40B4-BE49-F238E27FC236}">
+                <a16:creationId xmlns:a16="http://schemas.microsoft.com/office/drawing/2014/main" id="{856896C6-194F-4AA6-2FE8-751ED2593414}"/>
+              </a:ext>
+            </a:extLst>
+          </p:cNvPr>
+          <p:cNvSpPr txBox="1"/>
+          <p:nvPr/>
+        </p:nvSpPr>
+        <p:spPr>
+          <a:xfrm>
+            <a:off x="0" y="6747282"/>
+            <a:ext cx="7272997" cy="1046440"/>
+          </a:xfrm>
+          <a:prstGeom prst="rect">
+            <a:avLst/>
+          </a:prstGeom>
+          <a:noFill/>
+        </p:spPr>
+        <p:txBody>
+          <a:bodyPr wrap="square" rtlCol="0">
+            <a:spAutoFit/>
+          </a:bodyPr>
+          <a:lstStyle/>
+          <a:p>
+            <a:pPr algn="ctr"/>
+            <a:r>
+              <a:rPr lang="en-US" sz="4400" dirty="0">
+                <a:solidFill>
+                  <a:schemeClr val="bg1">
+                    <a:lumMod val="95000"/>
+                  </a:schemeClr>
+                </a:solidFill>
+                <a:latin typeface="Cooper Black" panose="0208090404030B020404" pitchFamily="18" charset="0"/>
+              </a:rPr>
+              <a:t>PROBLEM</a:t>
+            </a:r>
+          </a:p>
+          <a:p>
+            <a:pPr algn="ctr"/>
+            <a:r>
+              <a:rPr lang="en-US" dirty="0">
+                <a:solidFill>
+                  <a:schemeClr val="bg1">
+                    <a:lumMod val="95000"/>
+                  </a:schemeClr>
+                </a:solidFill>
+                <a:latin typeface="Cooper Black" panose="0208090404030B020404" pitchFamily="18" charset="0"/>
+              </a:rPr>
+              <a:t>Claims Processing and Fraud Detection Using AI</a:t>
+            </a:r>
+            <a:endParaRPr lang="en-KE" dirty="0">
+              <a:solidFill>
+                <a:schemeClr val="bg1">
+                  <a:lumMod val="95000"/>
+                </a:schemeClr>
+              </a:solidFill>
+              <a:latin typeface="Cooper Black" panose="0208090404030B020404" pitchFamily="18" charset="0"/>
+            </a:endParaRPr>
+          </a:p>
+        </p:txBody>
+      </p:sp>
+      <p:graphicFrame>
+        <p:nvGraphicFramePr>
+          <p:cNvPr id="8" name="Table 7">
+            <a:extLst>
+              <a:ext uri="{FF2B5EF4-FFF2-40B4-BE49-F238E27FC236}">
+                <a16:creationId xmlns:a16="http://schemas.microsoft.com/office/drawing/2014/main" id="{A74B0F42-D1C0-241C-C5AB-E63DC639A009}"/>
+              </a:ext>
+            </a:extLst>
+          </p:cNvPr>
+          <p:cNvGraphicFramePr>
+            <a:graphicFrameLocks noGrp="1"/>
+          </p:cNvGraphicFramePr>
+          <p:nvPr>
+            <p:extLst>
+              <p:ext uri="{D42A27DB-BD31-4B8C-83A1-F6EECF244321}">
+                <p14:modId xmlns:p14="http://schemas.microsoft.com/office/powerpoint/2010/main" val="2453868260"/>
+              </p:ext>
+            </p:extLst>
+          </p:nvPr>
+        </p:nvGraphicFramePr>
+        <p:xfrm>
+          <a:off x="267286" y="8006242"/>
+          <a:ext cx="6471140" cy="3791341"/>
+        </p:xfrm>
+        <a:graphic>
+          <a:graphicData uri="http://schemas.openxmlformats.org/drawingml/2006/table">
+            <a:tbl>
+              <a:tblPr firstRow="1" bandRow="1">
+                <a:tableStyleId>{5C22544A-7EE6-4342-B048-85BDC9FD1C3A}</a:tableStyleId>
+              </a:tblPr>
+              <a:tblGrid>
+                <a:gridCol w="3235570">
+                  <a:extLst>
+                    <a:ext uri="{9D8B030D-6E8A-4147-A177-3AD203B41FA5}">
+                      <a16:colId xmlns:a16="http://schemas.microsoft.com/office/drawing/2014/main" val="1224552694"/>
+                    </a:ext>
+                  </a:extLst>
+                </a:gridCol>
+                <a:gridCol w="3235570">
+                  <a:extLst>
+                    <a:ext uri="{9D8B030D-6E8A-4147-A177-3AD203B41FA5}">
+                      <a16:colId xmlns:a16="http://schemas.microsoft.com/office/drawing/2014/main" val="547653599"/>
+                    </a:ext>
+                  </a:extLst>
+                </a:gridCol>
+              </a:tblGrid>
+              <a:tr h="722674">
+                <a:tc>
+                  <a:txBody>
+                    <a:bodyPr/>
+                    <a:lstStyle/>
+                    <a:p>
+                      <a:pPr algn="ctr"/>
+                      <a:r>
+                        <a:rPr lang="en-US" dirty="0">
+                          <a:latin typeface="Cooper Black" panose="0208090404030B020404" pitchFamily="18" charset="0"/>
+                        </a:rPr>
+                        <a:t>Current State</a:t>
+                      </a:r>
+                      <a:endParaRPr lang="en-KE" dirty="0">
+                        <a:latin typeface="Cooper Black" panose="0208090404030B020404" pitchFamily="18" charset="0"/>
+                      </a:endParaRPr>
+                    </a:p>
+                  </a:txBody>
+                  <a:tcPr>
+                    <a:solidFill>
+                      <a:schemeClr val="tx2">
+                        <a:lumMod val="75000"/>
+                      </a:schemeClr>
+                    </a:solidFill>
+                  </a:tcPr>
+                </a:tc>
+                <a:tc>
+                  <a:txBody>
+                    <a:bodyPr/>
+                    <a:lstStyle/>
+                    <a:p>
+                      <a:pPr algn="ctr"/>
+                      <a:r>
+                        <a:rPr lang="en-US" dirty="0">
+                          <a:latin typeface="Cooper Black" panose="0208090404030B020404" pitchFamily="18" charset="0"/>
+                        </a:rPr>
+                        <a:t>Desired State</a:t>
+                      </a:r>
+                      <a:endParaRPr lang="en-KE" dirty="0">
+                        <a:latin typeface="Cooper Black" panose="0208090404030B020404" pitchFamily="18" charset="0"/>
+                      </a:endParaRPr>
+                    </a:p>
+                  </a:txBody>
+                  <a:tcPr>
+                    <a:solidFill>
+                      <a:schemeClr val="tx2">
+                        <a:lumMod val="75000"/>
+                      </a:schemeClr>
+                    </a:solidFill>
+                  </a:tcPr>
+                </a:tc>
+                <a:extLst>
+                  <a:ext uri="{0D108BD9-81ED-4DB2-BD59-A6C34878D82A}">
+                    <a16:rowId xmlns:a16="http://schemas.microsoft.com/office/drawing/2014/main" val="2725455756"/>
+                  </a:ext>
+                </a:extLst>
+              </a:tr>
+              <a:tr h="3068667">
+                <a:tc>
+                  <a:txBody>
+                    <a:bodyPr/>
+                    <a:lstStyle/>
+                    <a:p>
+                      <a:pPr marL="285750" indent="-285750">
+                        <a:buFont typeface="Arial" panose="020B0604020202020204" pitchFamily="34" charset="0"/>
+                        <a:buChar char="•"/>
+                      </a:pPr>
+                      <a:r>
+                        <a:rPr lang="en-US" dirty="0">
+                          <a:solidFill>
+                            <a:schemeClr val="bg1"/>
+                          </a:solidFill>
+                          <a:latin typeface="Cooper Black" panose="0208090404030B020404" pitchFamily="18" charset="0"/>
+                        </a:rPr>
+                        <a:t>Too much reliance on manual data entry and verification.</a:t>
+                      </a:r>
+                    </a:p>
+                    <a:p>
+                      <a:pPr marL="285750" indent="-285750">
+                        <a:buFont typeface="Arial" panose="020B0604020202020204" pitchFamily="34" charset="0"/>
+                        <a:buChar char="•"/>
+                      </a:pPr>
+                      <a:r>
+                        <a:rPr lang="en-US" dirty="0">
+                          <a:solidFill>
+                            <a:schemeClr val="bg1"/>
+                          </a:solidFill>
+                          <a:latin typeface="Cooper Black" panose="0208090404030B020404" pitchFamily="18" charset="0"/>
+                        </a:rPr>
+                        <a:t>Slow processing times.</a:t>
+                      </a:r>
+                    </a:p>
+                    <a:p>
+                      <a:pPr marL="285750" indent="-285750">
+                        <a:buFont typeface="Arial" panose="020B0604020202020204" pitchFamily="34" charset="0"/>
+                        <a:buChar char="•"/>
+                      </a:pPr>
+                      <a:r>
+                        <a:rPr lang="en-US" dirty="0">
+                          <a:solidFill>
+                            <a:schemeClr val="bg1"/>
+                          </a:solidFill>
+                          <a:latin typeface="Cooper Black" panose="0208090404030B020404" pitchFamily="18" charset="0"/>
+                        </a:rPr>
+                        <a:t>Fraudulent claims often slip through undetected.</a:t>
+                      </a:r>
+                    </a:p>
+                    <a:p>
+                      <a:pPr marL="285750" indent="-285750">
+                        <a:buFont typeface="Arial" panose="020B0604020202020204" pitchFamily="34" charset="0"/>
+                        <a:buChar char="•"/>
+                      </a:pPr>
+                      <a:r>
+                        <a:rPr lang="en-US" dirty="0">
+                          <a:solidFill>
+                            <a:schemeClr val="bg1"/>
+                          </a:solidFill>
+                          <a:latin typeface="Cooper Black" panose="0208090404030B020404" pitchFamily="18" charset="0"/>
+                        </a:rPr>
+                        <a:t>Frustrated Stakeholders</a:t>
+                      </a:r>
+                      <a:endParaRPr lang="en-KE" dirty="0">
+                        <a:solidFill>
+                          <a:schemeClr val="bg1"/>
+                        </a:solidFill>
+                        <a:latin typeface="Cooper Black" panose="0208090404030B020404" pitchFamily="18" charset="0"/>
+                      </a:endParaRPr>
+                    </a:p>
+                  </a:txBody>
+                  <a:tcPr>
+                    <a:solidFill>
+                      <a:schemeClr val="tx2">
+                        <a:lumMod val="75000"/>
+                      </a:schemeClr>
+                    </a:solidFill>
+                  </a:tcPr>
+                </a:tc>
+                <a:tc>
+                  <a:txBody>
+                    <a:bodyPr/>
+                    <a:lstStyle/>
+                    <a:p>
+                      <a:pPr marL="285750" indent="-285750">
+                        <a:buFont typeface="Arial" panose="020B0604020202020204" pitchFamily="34" charset="0"/>
+                        <a:buChar char="•"/>
+                      </a:pPr>
+                      <a:r>
+                        <a:rPr lang="en-US" dirty="0">
+                          <a:solidFill>
+                            <a:schemeClr val="bg1"/>
+                          </a:solidFill>
+                          <a:latin typeface="Cooper Black" panose="0208090404030B020404" pitchFamily="18" charset="0"/>
+                        </a:rPr>
+                        <a:t>Automated document processing.</a:t>
+                      </a:r>
+                    </a:p>
+                    <a:p>
+                      <a:pPr marL="285750" indent="-285750">
+                        <a:buFont typeface="Arial" panose="020B0604020202020204" pitchFamily="34" charset="0"/>
+                        <a:buChar char="•"/>
+                      </a:pPr>
+                      <a:r>
+                        <a:rPr lang="en-US" dirty="0">
+                          <a:solidFill>
+                            <a:schemeClr val="bg1"/>
+                          </a:solidFill>
+                          <a:latin typeface="Cooper Black" panose="0208090404030B020404" pitchFamily="18" charset="0"/>
+                        </a:rPr>
+                        <a:t>Faster claim settlement.</a:t>
+                      </a:r>
+                    </a:p>
+                    <a:p>
+                      <a:pPr marL="285750" indent="-285750">
+                        <a:buFont typeface="Arial" panose="020B0604020202020204" pitchFamily="34" charset="0"/>
+                        <a:buChar char="•"/>
+                      </a:pPr>
+                      <a:r>
+                        <a:rPr lang="en-US" dirty="0">
+                          <a:solidFill>
+                            <a:schemeClr val="bg1"/>
+                          </a:solidFill>
+                          <a:latin typeface="Cooper Black" panose="0208090404030B020404" pitchFamily="18" charset="0"/>
+                        </a:rPr>
+                        <a:t>Free staff for higher value tasks</a:t>
+                      </a:r>
+                    </a:p>
+                    <a:p>
+                      <a:pPr marL="285750" indent="-285750">
+                        <a:buFont typeface="Arial" panose="020B0604020202020204" pitchFamily="34" charset="0"/>
+                        <a:buChar char="•"/>
+                      </a:pPr>
+                      <a:r>
+                        <a:rPr lang="en-US" dirty="0">
+                          <a:solidFill>
+                            <a:schemeClr val="bg1"/>
+                          </a:solidFill>
+                          <a:latin typeface="Cooper Black" panose="0208090404030B020404" pitchFamily="18" charset="0"/>
+                        </a:rPr>
+                        <a:t>Enhanced customer experience with quicker solutions.</a:t>
+                      </a:r>
+                      <a:endParaRPr lang="en-KE" dirty="0">
+                        <a:solidFill>
+                          <a:schemeClr val="bg1"/>
+                        </a:solidFill>
+                        <a:latin typeface="Cooper Black" panose="0208090404030B020404" pitchFamily="18" charset="0"/>
+                      </a:endParaRPr>
+                    </a:p>
+                  </a:txBody>
+                  <a:tcPr>
+                    <a:solidFill>
+                      <a:schemeClr val="tx2">
+                        <a:lumMod val="75000"/>
+                      </a:schemeClr>
+                    </a:solidFill>
+                  </a:tcPr>
+                </a:tc>
+                <a:extLst>
+                  <a:ext uri="{0D108BD9-81ED-4DB2-BD59-A6C34878D82A}">
+                    <a16:rowId xmlns:a16="http://schemas.microsoft.com/office/drawing/2014/main" val="626691422"/>
+                  </a:ext>
+                </a:extLst>
+              </a:tr>
+            </a:tbl>
+          </a:graphicData>
+        </a:graphic>
+      </p:graphicFrame>
     </p:spTree>
     <p:extLst>
       <p:ext uri="{BB962C8B-B14F-4D97-AF65-F5344CB8AC3E}">
@@ -4247,6 +4562,18 @@
   <p:clrMapOvr>
     <a:masterClrMapping/>
   </p:clrMapOvr>
+  <mc:AlternateContent xmlns:mc="http://schemas.openxmlformats.org/markup-compatibility/2006">
+    <mc:Choice xmlns:p159="http://schemas.microsoft.com/office/powerpoint/2015/09/main" Requires="p159">
+      <p:transition xmlns:p14="http://schemas.microsoft.com/office/powerpoint/2010/main" spd="slow" p14:dur="2000">
+        <p159:morph option="byObject"/>
+      </p:transition>
+    </mc:Choice>
+    <mc:Fallback>
+      <p:transition spd="slow">
+        <p:fade/>
+      </p:transition>
+    </mc:Fallback>
+  </mc:AlternateContent>
 </p:sld>
 </file>
 
@@ -5349,6 +5676,18 @@
   <p:clrMapOvr>
     <a:masterClrMapping/>
   </p:clrMapOvr>
+  <mc:AlternateContent xmlns:mc="http://schemas.openxmlformats.org/markup-compatibility/2006">
+    <mc:Choice xmlns:p159="http://schemas.microsoft.com/office/powerpoint/2015/09/main" Requires="p159">
+      <p:transition xmlns:p14="http://schemas.microsoft.com/office/powerpoint/2010/main" spd="slow" p14:dur="2000">
+        <p159:morph option="byObject"/>
+      </p:transition>
+    </mc:Choice>
+    <mc:Fallback>
+      <p:transition spd="slow">
+        <p:fade/>
+      </p:transition>
+    </mc:Fallback>
+  </mc:AlternateContent>
 </p:sld>
 </file>
 
@@ -6294,6 +6633,18 @@
   <p:clrMapOvr>
     <a:masterClrMapping/>
   </p:clrMapOvr>
+  <mc:AlternateContent xmlns:mc="http://schemas.openxmlformats.org/markup-compatibility/2006">
+    <mc:Choice xmlns:p159="http://schemas.microsoft.com/office/powerpoint/2015/09/main" Requires="p159">
+      <p:transition xmlns:p14="http://schemas.microsoft.com/office/powerpoint/2010/main" spd="slow" p14:dur="2000">
+        <p159:morph option="byObject"/>
+      </p:transition>
+    </mc:Choice>
+    <mc:Fallback>
+      <p:transition spd="slow">
+        <p:fade/>
+      </p:transition>
+    </mc:Fallback>
+  </mc:AlternateContent>
 </p:sld>
 </file>
 
@@ -7086,7 +7437,9 @@
             <a:r>
               <a:rPr lang="en-US" sz="4000" dirty="0">
                 <a:solidFill>
-                  <a:schemeClr val="bg1"/>
+                  <a:schemeClr val="bg1">
+                    <a:lumMod val="95000"/>
+                  </a:schemeClr>
                 </a:solidFill>
                 <a:latin typeface="Cooper Black" panose="0208090404030B020404" pitchFamily="18" charset="0"/>
               </a:rPr>
@@ -7101,7 +7454,9 @@
             <a:r>
               <a:rPr lang="en-US" sz="4000" dirty="0">
                 <a:solidFill>
-                  <a:schemeClr val="bg1"/>
+                  <a:schemeClr val="bg1">
+                    <a:lumMod val="95000"/>
+                  </a:schemeClr>
                 </a:solidFill>
                 <a:latin typeface="Cooper Black" panose="0208090404030B020404" pitchFamily="18" charset="0"/>
               </a:rPr>
@@ -7116,8 +7471,13 @@
             <a:r>
               <a:rPr lang="en-US" sz="4000" dirty="0">
                 <a:solidFill>
-                  <a:schemeClr val="bg1"/>
+                  <a:schemeClr val="bg1">
+                    <a:lumMod val="95000"/>
+                  </a:schemeClr>
                 </a:solidFill>
+                <a:highlight>
+                  <a:srgbClr val="808080"/>
+                </a:highlight>
                 <a:latin typeface="Cooper Black" panose="0208090404030B020404" pitchFamily="18" charset="0"/>
               </a:rPr>
               <a:t>Claims Notifications</a:t>
@@ -7131,11 +7491,27 @@
             <a:r>
               <a:rPr lang="en-US" sz="4000" dirty="0">
                 <a:solidFill>
-                  <a:schemeClr val="bg1"/>
+                  <a:schemeClr val="bg1">
+                    <a:lumMod val="95000"/>
+                  </a:schemeClr>
+                </a:solidFill>
+                <a:highlight>
+                  <a:srgbClr val="808080"/>
+                </a:highlight>
+                <a:latin typeface="Cooper Black" panose="0208090404030B020404" pitchFamily="18" charset="0"/>
+              </a:rPr>
+              <a:t>Cash Call </a:t>
+            </a:r>
+            <a:r>
+              <a:rPr lang="en-US" sz="4000" dirty="0">
+                <a:solidFill>
+                  <a:schemeClr val="bg1">
+                    <a:lumMod val="95000"/>
+                  </a:schemeClr>
                 </a:solidFill>
                 <a:latin typeface="Cooper Black" panose="0208090404030B020404" pitchFamily="18" charset="0"/>
               </a:rPr>
-              <a:t>Cash Call Reports</a:t>
+              <a:t>Reports</a:t>
             </a:r>
           </a:p>
           <a:p>
@@ -7146,16 +7522,37 @@
             <a:r>
               <a:rPr lang="en-US" sz="4000" dirty="0">
                 <a:solidFill>
-                  <a:schemeClr val="bg1"/>
+                  <a:schemeClr val="bg1">
+                    <a:lumMod val="95000"/>
+                  </a:schemeClr>
                 </a:solidFill>
                 <a:latin typeface="Cooper Black" panose="0208090404030B020404" pitchFamily="18" charset="0"/>
               </a:rPr>
-              <a:t>SICS Treaty Details</a:t>
+              <a:t>SICS Treaty D</a:t>
+            </a:r>
+            <a:r>
+              <a:rPr lang="en-US" sz="4000" dirty="0">
+                <a:solidFill>
+                  <a:schemeClr val="bg1">
+                    <a:lumMod val="95000"/>
+                  </a:schemeClr>
+                </a:solidFill>
+                <a:highlight>
+                  <a:srgbClr val="808080"/>
+                </a:highlight>
+                <a:latin typeface="Cooper Black" panose="0208090404030B020404" pitchFamily="18" charset="0"/>
+              </a:rPr>
+              <a:t>etails</a:t>
             </a:r>
             <a:endParaRPr lang="en-KE" sz="4000" dirty="0">
               <a:solidFill>
-                <a:schemeClr val="bg1"/>
+                <a:schemeClr val="bg1">
+                  <a:lumMod val="95000"/>
+                </a:schemeClr>
               </a:solidFill>
+              <a:highlight>
+                <a:srgbClr val="808080"/>
+              </a:highlight>
               <a:latin typeface="Cooper Black" panose="0208090404030B020404" pitchFamily="18" charset="0"/>
             </a:endParaRPr>
           </a:p>
@@ -7211,6 +7608,18 @@
   <p:clrMapOvr>
     <a:masterClrMapping/>
   </p:clrMapOvr>
+  <mc:AlternateContent xmlns:mc="http://schemas.openxmlformats.org/markup-compatibility/2006">
+    <mc:Choice xmlns:p159="http://schemas.microsoft.com/office/powerpoint/2015/09/main" Requires="p159">
+      <p:transition xmlns:p14="http://schemas.microsoft.com/office/powerpoint/2010/main" spd="slow" p14:dur="2000">
+        <p159:morph option="byObject"/>
+      </p:transition>
+    </mc:Choice>
+    <mc:Fallback>
+      <p:transition spd="slow">
+        <p:fade/>
+      </p:transition>
+    </mc:Fallback>
+  </mc:AlternateContent>
 </p:sld>
 </file>
 
@@ -8066,6 +8475,18 @@
   <p:clrMapOvr>
     <a:masterClrMapping/>
   </p:clrMapOvr>
+  <mc:AlternateContent xmlns:mc="http://schemas.openxmlformats.org/markup-compatibility/2006">
+    <mc:Choice xmlns:p159="http://schemas.microsoft.com/office/powerpoint/2015/09/main" Requires="p159">
+      <p:transition xmlns:p14="http://schemas.microsoft.com/office/powerpoint/2010/main" spd="slow" p14:dur="2000">
+        <p159:morph option="byObject"/>
+      </p:transition>
+    </mc:Choice>
+    <mc:Fallback>
+      <p:transition spd="slow">
+        <p:fade/>
+      </p:transition>
+    </mc:Fallback>
+  </mc:AlternateContent>
 </p:sld>
 </file>
 
@@ -8974,6 +9395,18 @@
   <p:clrMapOvr>
     <a:masterClrMapping/>
   </p:clrMapOvr>
+  <mc:AlternateContent xmlns:mc="http://schemas.openxmlformats.org/markup-compatibility/2006">
+    <mc:Choice xmlns:p159="http://schemas.microsoft.com/office/powerpoint/2015/09/main" Requires="p159">
+      <p:transition xmlns:p14="http://schemas.microsoft.com/office/powerpoint/2010/main" spd="slow" p14:dur="2000">
+        <p159:morph option="byObject"/>
+      </p:transition>
+    </mc:Choice>
+    <mc:Fallback>
+      <p:transition spd="slow">
+        <p:fade/>
+      </p:transition>
+    </mc:Fallback>
+  </mc:AlternateContent>
 </p:sld>
 </file>
 
@@ -9689,6 +10122,194 @@
           </a:p>
         </p:txBody>
       </p:sp>
+      <p:sp>
+        <p:nvSpPr>
+          <p:cNvPr id="2" name="TextBox 1">
+            <a:extLst>
+              <a:ext uri="{FF2B5EF4-FFF2-40B4-BE49-F238E27FC236}">
+                <a16:creationId xmlns:a16="http://schemas.microsoft.com/office/drawing/2014/main" id="{B457ABA7-7910-DFFF-F1CE-DBE3316AA84D}"/>
+              </a:ext>
+            </a:extLst>
+          </p:cNvPr>
+          <p:cNvSpPr txBox="1"/>
+          <p:nvPr/>
+        </p:nvSpPr>
+        <p:spPr>
+          <a:xfrm>
+            <a:off x="351692" y="309489"/>
+            <a:ext cx="6822831" cy="923330"/>
+          </a:xfrm>
+          <a:prstGeom prst="rect">
+            <a:avLst/>
+          </a:prstGeom>
+          <a:noFill/>
+        </p:spPr>
+        <p:txBody>
+          <a:bodyPr wrap="square" rtlCol="0">
+            <a:spAutoFit/>
+          </a:bodyPr>
+          <a:lstStyle/>
+          <a:p>
+            <a:pPr algn="ctr"/>
+            <a:r>
+              <a:rPr lang="en-US" sz="5400" dirty="0">
+                <a:solidFill>
+                  <a:schemeClr val="bg1"/>
+                </a:solidFill>
+                <a:latin typeface="Cooper Black" panose="0208090404030B020404" pitchFamily="18" charset="0"/>
+              </a:rPr>
+              <a:t>TOOLS USED</a:t>
+            </a:r>
+            <a:endParaRPr lang="en-KE" sz="5400" dirty="0">
+              <a:solidFill>
+                <a:schemeClr val="bg1"/>
+              </a:solidFill>
+              <a:latin typeface="Cooper Black" panose="0208090404030B020404" pitchFamily="18" charset="0"/>
+            </a:endParaRPr>
+          </a:p>
+        </p:txBody>
+      </p:sp>
+      <p:sp>
+        <p:nvSpPr>
+          <p:cNvPr id="3" name="TextBox 2">
+            <a:extLst>
+              <a:ext uri="{FF2B5EF4-FFF2-40B4-BE49-F238E27FC236}">
+                <a16:creationId xmlns:a16="http://schemas.microsoft.com/office/drawing/2014/main" id="{CC82F019-F71A-93C2-4BB7-A5CBD39B6F9B}"/>
+              </a:ext>
+            </a:extLst>
+          </p:cNvPr>
+          <p:cNvSpPr txBox="1"/>
+          <p:nvPr/>
+        </p:nvSpPr>
+        <p:spPr>
+          <a:xfrm>
+            <a:off x="140677" y="1232819"/>
+            <a:ext cx="6822831" cy="5016758"/>
+          </a:xfrm>
+          <a:prstGeom prst="rect">
+            <a:avLst/>
+          </a:prstGeom>
+          <a:noFill/>
+        </p:spPr>
+        <p:txBody>
+          <a:bodyPr wrap="square" rtlCol="0">
+            <a:spAutoFit/>
+          </a:bodyPr>
+          <a:lstStyle/>
+          <a:p>
+            <a:pPr marL="285750" indent="-285750">
+              <a:buFont typeface="Arial" panose="020B0604020202020204" pitchFamily="34" charset="0"/>
+              <a:buChar char="•"/>
+            </a:pPr>
+            <a:r>
+              <a:rPr lang="en-US" sz="3200" dirty="0">
+                <a:solidFill>
+                  <a:schemeClr val="bg1"/>
+                </a:solidFill>
+                <a:latin typeface="Cooper Black" panose="0208090404030B020404" pitchFamily="18" charset="0"/>
+              </a:rPr>
+              <a:t>Mermaid Live Server and Editor for coding and drawing the workflow.</a:t>
+            </a:r>
+          </a:p>
+          <a:p>
+            <a:pPr marL="285750" indent="-285750">
+              <a:buFont typeface="Arial" panose="020B0604020202020204" pitchFamily="34" charset="0"/>
+              <a:buChar char="•"/>
+            </a:pPr>
+            <a:r>
+              <a:rPr lang="en-US" sz="3200" dirty="0">
+                <a:solidFill>
+                  <a:schemeClr val="bg1"/>
+                </a:solidFill>
+                <a:latin typeface="Cooper Black" panose="0208090404030B020404" pitchFamily="18" charset="0"/>
+              </a:rPr>
+              <a:t>Chat GPT &amp; Cloud AI for more insight on various terms used in Reinsurance.</a:t>
+            </a:r>
+          </a:p>
+          <a:p>
+            <a:pPr marL="285750" indent="-285750">
+              <a:buFont typeface="Arial" panose="020B0604020202020204" pitchFamily="34" charset="0"/>
+              <a:buChar char="•"/>
+            </a:pPr>
+            <a:r>
+              <a:rPr lang="en-US" sz="3200" dirty="0">
+                <a:solidFill>
+                  <a:schemeClr val="bg1"/>
+                </a:solidFill>
+                <a:latin typeface="Cooper Black" panose="0208090404030B020404" pitchFamily="18" charset="0"/>
+              </a:rPr>
+              <a:t>Microsoft Visual Code as the IDE for Python.</a:t>
+            </a:r>
+          </a:p>
+          <a:p>
+            <a:pPr marL="285750" indent="-285750">
+              <a:buFont typeface="Arial" panose="020B0604020202020204" pitchFamily="34" charset="0"/>
+              <a:buChar char="•"/>
+            </a:pPr>
+            <a:r>
+              <a:rPr lang="en-US" sz="3200" dirty="0">
+                <a:solidFill>
+                  <a:schemeClr val="bg1"/>
+                </a:solidFill>
+                <a:latin typeface="Cooper Black" panose="0208090404030B020404" pitchFamily="18" charset="0"/>
+              </a:rPr>
+              <a:t>Lang Chain for developing an AI agent.</a:t>
+            </a:r>
+            <a:endParaRPr lang="en-KE" sz="3200" dirty="0">
+              <a:solidFill>
+                <a:schemeClr val="bg1"/>
+              </a:solidFill>
+              <a:latin typeface="Cooper Black" panose="0208090404030B020404" pitchFamily="18" charset="0"/>
+            </a:endParaRPr>
+          </a:p>
+        </p:txBody>
+      </p:sp>
+      <p:sp>
+        <p:nvSpPr>
+          <p:cNvPr id="4" name="TextBox 3">
+            <a:extLst>
+              <a:ext uri="{FF2B5EF4-FFF2-40B4-BE49-F238E27FC236}">
+                <a16:creationId xmlns:a16="http://schemas.microsoft.com/office/drawing/2014/main" id="{B83740E4-60E2-AB62-82F2-A20B44EC2E93}"/>
+              </a:ext>
+            </a:extLst>
+          </p:cNvPr>
+          <p:cNvSpPr txBox="1"/>
+          <p:nvPr/>
+        </p:nvSpPr>
+        <p:spPr>
+          <a:xfrm>
+            <a:off x="8030307" y="2392711"/>
+            <a:ext cx="1336431" cy="1569660"/>
+          </a:xfrm>
+          <a:prstGeom prst="rect">
+            <a:avLst/>
+          </a:prstGeom>
+          <a:noFill/>
+        </p:spPr>
+        <p:txBody>
+          <a:bodyPr wrap="square" rtlCol="0">
+            <a:spAutoFit/>
+          </a:bodyPr>
+          <a:lstStyle/>
+          <a:p>
+            <a:r>
+              <a:rPr lang="en-US" sz="9600" dirty="0">
+                <a:solidFill>
+                  <a:schemeClr val="bg1"/>
+                </a:solidFill>
+                <a:latin typeface="Cooper Black" panose="0208090404030B020404" pitchFamily="18" charset="0"/>
+              </a:rPr>
+              <a:t>7</a:t>
+            </a:r>
+            <a:endParaRPr lang="en-KE" sz="9600" dirty="0">
+              <a:solidFill>
+                <a:schemeClr val="bg1"/>
+              </a:solidFill>
+              <a:latin typeface="Cooper Black" panose="0208090404030B020404" pitchFamily="18" charset="0"/>
+            </a:endParaRPr>
+          </a:p>
+        </p:txBody>
+      </p:sp>
     </p:spTree>
     <p:extLst>
       <p:ext uri="{BB962C8B-B14F-4D97-AF65-F5344CB8AC3E}">
@@ -9699,6 +10320,18 @@
   <p:clrMapOvr>
     <a:masterClrMapping/>
   </p:clrMapOvr>
+  <mc:AlternateContent xmlns:mc="http://schemas.openxmlformats.org/markup-compatibility/2006">
+    <mc:Choice xmlns:p159="http://schemas.microsoft.com/office/powerpoint/2015/09/main" Requires="p159">
+      <p:transition xmlns:p14="http://schemas.microsoft.com/office/powerpoint/2010/main" spd="slow" p14:dur="2000">
+        <p159:morph option="byObject"/>
+      </p:transition>
+    </mc:Choice>
+    <mc:Fallback>
+      <p:transition spd="slow">
+        <p:fade/>
+      </p:transition>
+    </mc:Fallback>
+  </mc:AlternateContent>
 </p:sld>
 </file>
 
@@ -10410,6 +11043,146 @@
           </a:p>
         </p:txBody>
       </p:sp>
+      <p:sp>
+        <p:nvSpPr>
+          <p:cNvPr id="2" name="TextBox 1">
+            <a:extLst>
+              <a:ext uri="{FF2B5EF4-FFF2-40B4-BE49-F238E27FC236}">
+                <a16:creationId xmlns:a16="http://schemas.microsoft.com/office/drawing/2014/main" id="{F2E176E9-33AC-9936-EA79-A993C72E4265}"/>
+              </a:ext>
+            </a:extLst>
+          </p:cNvPr>
+          <p:cNvSpPr txBox="1"/>
+          <p:nvPr/>
+        </p:nvSpPr>
+        <p:spPr>
+          <a:xfrm>
+            <a:off x="492369" y="182880"/>
+            <a:ext cx="6654019" cy="1015663"/>
+          </a:xfrm>
+          <a:prstGeom prst="rect">
+            <a:avLst/>
+          </a:prstGeom>
+          <a:noFill/>
+        </p:spPr>
+        <p:txBody>
+          <a:bodyPr wrap="square" rtlCol="0">
+            <a:spAutoFit/>
+          </a:bodyPr>
+          <a:lstStyle/>
+          <a:p>
+            <a:pPr algn="ctr"/>
+            <a:r>
+              <a:rPr lang="en-US" sz="6000" dirty="0">
+                <a:solidFill>
+                  <a:schemeClr val="bg1"/>
+                </a:solidFill>
+                <a:latin typeface="Cooper Black" panose="0208090404030B020404" pitchFamily="18" charset="0"/>
+              </a:rPr>
+              <a:t>CONCLUSION</a:t>
+            </a:r>
+            <a:endParaRPr lang="en-KE" sz="6000" dirty="0">
+              <a:solidFill>
+                <a:schemeClr val="bg1"/>
+              </a:solidFill>
+              <a:latin typeface="Cooper Black" panose="0208090404030B020404" pitchFamily="18" charset="0"/>
+            </a:endParaRPr>
+          </a:p>
+        </p:txBody>
+      </p:sp>
+      <p:sp>
+        <p:nvSpPr>
+          <p:cNvPr id="3" name="TextBox 2">
+            <a:extLst>
+              <a:ext uri="{FF2B5EF4-FFF2-40B4-BE49-F238E27FC236}">
+                <a16:creationId xmlns:a16="http://schemas.microsoft.com/office/drawing/2014/main" id="{137C0E10-923E-ED98-F98D-A86F0B8FD28E}"/>
+              </a:ext>
+            </a:extLst>
+          </p:cNvPr>
+          <p:cNvSpPr txBox="1"/>
+          <p:nvPr/>
+        </p:nvSpPr>
+        <p:spPr>
+          <a:xfrm>
+            <a:off x="126609" y="1198543"/>
+            <a:ext cx="6766560" cy="5262979"/>
+          </a:xfrm>
+          <a:prstGeom prst="rect">
+            <a:avLst/>
+          </a:prstGeom>
+          <a:noFill/>
+        </p:spPr>
+        <p:txBody>
+          <a:bodyPr wrap="square" rtlCol="0">
+            <a:spAutoFit/>
+          </a:bodyPr>
+          <a:lstStyle/>
+          <a:p>
+            <a:r>
+              <a:rPr lang="en-US" sz="2800" dirty="0">
+                <a:solidFill>
+                  <a:schemeClr val="bg1"/>
+                </a:solidFill>
+                <a:latin typeface="Cooper Black" panose="0208090404030B020404" pitchFamily="18" charset="0"/>
+              </a:rPr>
+              <a:t>It has been an honor to be here, and given this opportunity to participate in this hackathon. We have learnt a lot from each other and it was exciting interacting with people in the field.</a:t>
+            </a:r>
+          </a:p>
+          <a:p>
+            <a:r>
+              <a:rPr lang="en-US" sz="2800" dirty="0">
+                <a:solidFill>
+                  <a:schemeClr val="bg1"/>
+                </a:solidFill>
+                <a:latin typeface="Cooper Black" panose="0208090404030B020404" pitchFamily="18" charset="0"/>
+              </a:rPr>
+              <a:t>We are grateful to Kenya RE and University of Nairobi for organizing the event.</a:t>
+            </a:r>
+            <a:br>
+              <a:rPr lang="en-US" sz="2800" dirty="0">
+                <a:solidFill>
+                  <a:schemeClr val="bg1"/>
+                </a:solidFill>
+                <a:latin typeface="Cooper Black" panose="0208090404030B020404" pitchFamily="18" charset="0"/>
+              </a:rPr>
+            </a:br>
+            <a:r>
+              <a:rPr lang="en-US" sz="2800" dirty="0">
+                <a:solidFill>
+                  <a:schemeClr val="bg1"/>
+                </a:solidFill>
+                <a:latin typeface="Cooper Black" panose="0208090404030B020404" pitchFamily="18" charset="0"/>
+              </a:rPr>
+              <a:t>It has been a blast!</a:t>
+            </a:r>
+          </a:p>
+          <a:p>
+            <a:endParaRPr lang="en-US" sz="2800" dirty="0">
+              <a:solidFill>
+                <a:schemeClr val="bg1"/>
+              </a:solidFill>
+              <a:latin typeface="Cooper Black" panose="0208090404030B020404" pitchFamily="18" charset="0"/>
+            </a:endParaRPr>
+          </a:p>
+          <a:p>
+            <a:r>
+              <a:rPr lang="en-US" sz="2800" dirty="0">
+                <a:solidFill>
+                  <a:schemeClr val="bg1"/>
+                </a:solidFill>
+                <a:latin typeface="Cooper Black" panose="0208090404030B020404" pitchFamily="18" charset="0"/>
+              </a:rPr>
+              <a:t>The Hacknovators.</a:t>
+            </a:r>
+            <a:endParaRPr lang="en-KE" sz="2800" dirty="0">
+              <a:solidFill>
+                <a:schemeClr val="bg1"/>
+              </a:solidFill>
+              <a:latin typeface="Cooper Black" panose="0208090404030B020404" pitchFamily="18" charset="0"/>
+            </a:endParaRPr>
+          </a:p>
+        </p:txBody>
+      </p:sp>
     </p:spTree>
     <p:extLst>
       <p:ext uri="{BB962C8B-B14F-4D97-AF65-F5344CB8AC3E}">
@@ -10420,6 +11193,18 @@
   <p:clrMapOvr>
     <a:masterClrMapping/>
   </p:clrMapOvr>
+  <mc:AlternateContent xmlns:mc="http://schemas.openxmlformats.org/markup-compatibility/2006">
+    <mc:Choice xmlns:p159="http://schemas.microsoft.com/office/powerpoint/2015/09/main" Requires="p159">
+      <p:transition xmlns:p14="http://schemas.microsoft.com/office/powerpoint/2010/main" spd="slow" p14:dur="2000">
+        <p159:morph option="byObject"/>
+      </p:transition>
+    </mc:Choice>
+    <mc:Fallback>
+      <p:transition spd="slow">
+        <p:fade/>
+      </p:transition>
+    </mc:Fallback>
+  </mc:AlternateContent>
 </p:sld>
 </file>
 

</xml_diff>